<commit_message>
Last commit of 2022: Removed manual, added logo drafts and translation improvements
</commit_message>
<xml_diff>
--- a/data/thumbnails/logoQuickDE.pptx
+++ b/data/thumbnails/logoQuickDE.pptx
@@ -2,12 +2,12 @@
 <file path=ppt/presentation.xml><?xml version="1.0" encoding="utf-8"?>
 <p:presentation xmlns:a="http://schemas.openxmlformats.org/drawingml/2006/main" xmlns:r="http://schemas.openxmlformats.org/officeDocument/2006/relationships" xmlns:p="http://schemas.openxmlformats.org/presentationml/2006/main" saveSubsetFonts="1">
   <p:sldMasterIdLst>
-    <p:sldMasterId id="2147483674" r:id="rId1"/>
+    <p:sldMasterId id="2147483650" r:id="rId1"/>
   </p:sldMasterIdLst>
   <p:sldIdLst>
     <p:sldId id="256" r:id="rId2"/>
   </p:sldIdLst>
-  <p:sldSz cx="30600650" cy="3049588"/>
+  <p:sldSz cx="12193588" cy="3049588"/>
   <p:notesSz cx="6858000" cy="9144000"/>
   <p:defaultTextStyle>
     <a:defPPr>
@@ -112,7 +112,7 @@
             <a:srgbClr val="A4A3A4"/>
           </p15:clr>
         </p15:guide>
-        <p15:guide id="2" pos="9639" userDrawn="1">
+        <p15:guide id="2" pos="3841" userDrawn="1">
           <p15:clr>
             <a:srgbClr val="A4A3A4"/>
           </p15:clr>
@@ -126,320 +126,62 @@
 <file path=ppt/changesInfos/changesInfo1.xml><?xml version="1.0" encoding="utf-8"?>
 <pc:chgInfo xmlns:a="http://schemas.openxmlformats.org/drawingml/2006/main" xmlns:r="http://schemas.openxmlformats.org/officeDocument/2006/relationships" xmlns:ac="http://schemas.microsoft.com/office/drawing/2013/main/command" xmlns:pc="http://schemas.microsoft.com/office/powerpoint/2013/main/command">
   <pc:docChgLst>
-    <pc:chgData name="Piet R." userId="d5a61a8c4b1a1e6c" providerId="LiveId" clId="{308A495C-14FA-4395-A08C-1DD6C0A4BB0B}"/>
-    <pc:docChg chg="undo custSel modSld modMainMaster">
-      <pc:chgData name="Piet R." userId="d5a61a8c4b1a1e6c" providerId="LiveId" clId="{308A495C-14FA-4395-A08C-1DD6C0A4BB0B}" dt="2022-12-25T23:13:10.882" v="115" actId="207"/>
+    <pc:chgData name="Piet R." userId="d5a61a8c4b1a1e6c" providerId="LiveId" clId="{977426CC-4A6C-47CE-A8CA-F4368466D585}"/>
+    <pc:docChg chg="undo custSel modSld">
+      <pc:chgData name="Piet R." userId="d5a61a8c4b1a1e6c" providerId="LiveId" clId="{977426CC-4A6C-47CE-A8CA-F4368466D585}" dt="2022-12-03T13:45:21.521" v="227" actId="165"/>
       <pc:docMkLst>
         <pc:docMk/>
       </pc:docMkLst>
-      <pc:sldChg chg="modSp mod">
-        <pc:chgData name="Piet R." userId="d5a61a8c4b1a1e6c" providerId="LiveId" clId="{308A495C-14FA-4395-A08C-1DD6C0A4BB0B}" dt="2022-12-25T23:13:10.882" v="115" actId="207"/>
+      <pc:sldChg chg="addSp delSp modSp mod">
+        <pc:chgData name="Piet R." userId="d5a61a8c4b1a1e6c" providerId="LiveId" clId="{977426CC-4A6C-47CE-A8CA-F4368466D585}" dt="2022-12-03T13:45:21.521" v="227" actId="165"/>
         <pc:sldMkLst>
           <pc:docMk/>
           <pc:sldMk cId="3363793898" sldId="256"/>
         </pc:sldMkLst>
+        <pc:spChg chg="add mod topLvl">
+          <ac:chgData name="Piet R." userId="d5a61a8c4b1a1e6c" providerId="LiveId" clId="{977426CC-4A6C-47CE-A8CA-F4368466D585}" dt="2022-12-03T13:45:21.521" v="227" actId="165"/>
+          <ac:spMkLst>
+            <pc:docMk/>
+            <pc:sldMk cId="3363793898" sldId="256"/>
+            <ac:spMk id="4" creationId="{EF40C7D3-5F24-48ED-B417-CA3254D864BB}"/>
+          </ac:spMkLst>
+        </pc:spChg>
         <pc:spChg chg="mod">
-          <ac:chgData name="Piet R." userId="d5a61a8c4b1a1e6c" providerId="LiveId" clId="{308A495C-14FA-4395-A08C-1DD6C0A4BB0B}" dt="2022-12-25T23:13:10.882" v="115" actId="207"/>
+          <ac:chgData name="Piet R." userId="d5a61a8c4b1a1e6c" providerId="LiveId" clId="{977426CC-4A6C-47CE-A8CA-F4368466D585}" dt="2022-12-03T13:43:01.292" v="226" actId="1035"/>
           <ac:spMkLst>
             <pc:docMk/>
             <pc:sldMk cId="3363793898" sldId="256"/>
             <ac:spMk id="6" creationId="{49B9353A-ADA8-405F-99B6-B67506CD4EB7}"/>
           </ac:spMkLst>
         </pc:spChg>
-        <pc:picChg chg="mod">
-          <ac:chgData name="Piet R." userId="d5a61a8c4b1a1e6c" providerId="LiveId" clId="{308A495C-14FA-4395-A08C-1DD6C0A4BB0B}" dt="2022-12-25T23:12:30.664" v="113" actId="14100"/>
-          <ac:picMkLst>
+        <pc:spChg chg="add mod topLvl">
+          <ac:chgData name="Piet R." userId="d5a61a8c4b1a1e6c" providerId="LiveId" clId="{977426CC-4A6C-47CE-A8CA-F4368466D585}" dt="2022-12-03T13:45:21.521" v="227" actId="165"/>
+          <ac:spMkLst>
             <pc:docMk/>
             <pc:sldMk cId="3363793898" sldId="256"/>
-            <ac:picMk id="5" creationId="{DCCF2F75-2A5F-44EE-884F-F2A7F4C226C7}"/>
-          </ac:picMkLst>
-        </pc:picChg>
-      </pc:sldChg>
-      <pc:sldMasterChg chg="modSp modSldLayout">
-        <pc:chgData name="Piet R." userId="d5a61a8c4b1a1e6c" providerId="LiveId" clId="{308A495C-14FA-4395-A08C-1DD6C0A4BB0B}" dt="2022-12-25T23:11:16.648" v="0"/>
-        <pc:sldMasterMkLst>
-          <pc:docMk/>
-          <pc:sldMasterMk cId="1692767427" sldId="2147483650"/>
-        </pc:sldMasterMkLst>
-        <pc:spChg chg="mod">
-          <ac:chgData name="Piet R." userId="d5a61a8c4b1a1e6c" providerId="LiveId" clId="{308A495C-14FA-4395-A08C-1DD6C0A4BB0B}" dt="2022-12-25T23:11:16.648" v="0"/>
-          <ac:spMkLst>
-            <pc:docMk/>
-            <pc:sldMasterMk cId="1692767427" sldId="2147483650"/>
-            <ac:spMk id="2" creationId="{00000000-0000-0000-0000-000000000000}"/>
+            <ac:spMk id="7" creationId="{6A8B9C31-6771-4864-919E-7D5534589030}"/>
           </ac:spMkLst>
         </pc:spChg>
-        <pc:spChg chg="mod">
-          <ac:chgData name="Piet R." userId="d5a61a8c4b1a1e6c" providerId="LiveId" clId="{308A495C-14FA-4395-A08C-1DD6C0A4BB0B}" dt="2022-12-25T23:11:16.648" v="0"/>
-          <ac:spMkLst>
+        <pc:grpChg chg="add del mod">
+          <ac:chgData name="Piet R." userId="d5a61a8c4b1a1e6c" providerId="LiveId" clId="{977426CC-4A6C-47CE-A8CA-F4368466D585}" dt="2022-12-03T13:45:21.521" v="227" actId="165"/>
+          <ac:grpSpMkLst>
             <pc:docMk/>
-            <pc:sldMasterMk cId="1692767427" sldId="2147483650"/>
-            <ac:spMk id="3" creationId="{00000000-0000-0000-0000-000000000000}"/>
-          </ac:spMkLst>
-        </pc:spChg>
-        <pc:spChg chg="mod">
-          <ac:chgData name="Piet R." userId="d5a61a8c4b1a1e6c" providerId="LiveId" clId="{308A495C-14FA-4395-A08C-1DD6C0A4BB0B}" dt="2022-12-25T23:11:16.648" v="0"/>
-          <ac:spMkLst>
-            <pc:docMk/>
-            <pc:sldMasterMk cId="1692767427" sldId="2147483650"/>
-            <ac:spMk id="4" creationId="{00000000-0000-0000-0000-000000000000}"/>
-          </ac:spMkLst>
-        </pc:spChg>
-        <pc:spChg chg="mod">
-          <ac:chgData name="Piet R." userId="d5a61a8c4b1a1e6c" providerId="LiveId" clId="{308A495C-14FA-4395-A08C-1DD6C0A4BB0B}" dt="2022-12-25T23:11:16.648" v="0"/>
-          <ac:spMkLst>
-            <pc:docMk/>
-            <pc:sldMasterMk cId="1692767427" sldId="2147483650"/>
-            <ac:spMk id="5" creationId="{00000000-0000-0000-0000-000000000000}"/>
-          </ac:spMkLst>
-        </pc:spChg>
-        <pc:spChg chg="mod">
-          <ac:chgData name="Piet R." userId="d5a61a8c4b1a1e6c" providerId="LiveId" clId="{308A495C-14FA-4395-A08C-1DD6C0A4BB0B}" dt="2022-12-25T23:11:16.648" v="0"/>
-          <ac:spMkLst>
-            <pc:docMk/>
-            <pc:sldMasterMk cId="1692767427" sldId="2147483650"/>
-            <ac:spMk id="6" creationId="{00000000-0000-0000-0000-000000000000}"/>
-          </ac:spMkLst>
-        </pc:spChg>
-        <pc:sldLayoutChg chg="modSp">
-          <pc:chgData name="Piet R." userId="d5a61a8c4b1a1e6c" providerId="LiveId" clId="{308A495C-14FA-4395-A08C-1DD6C0A4BB0B}" dt="2022-12-25T23:11:16.648" v="0"/>
-          <pc:sldLayoutMkLst>
-            <pc:docMk/>
-            <pc:sldMasterMk cId="1692767427" sldId="2147483650"/>
-            <pc:sldLayoutMk cId="3349558861" sldId="2147483651"/>
-          </pc:sldLayoutMkLst>
-          <pc:spChg chg="mod">
-            <ac:chgData name="Piet R." userId="d5a61a8c4b1a1e6c" providerId="LiveId" clId="{308A495C-14FA-4395-A08C-1DD6C0A4BB0B}" dt="2022-12-25T23:11:16.648" v="0"/>
-            <ac:spMkLst>
-              <pc:docMk/>
-              <pc:sldMasterMk cId="1692767427" sldId="2147483650"/>
-              <pc:sldLayoutMk cId="3349558861" sldId="2147483651"/>
-              <ac:spMk id="2" creationId="{00000000-0000-0000-0000-000000000000}"/>
-            </ac:spMkLst>
-          </pc:spChg>
-          <pc:spChg chg="mod">
-            <ac:chgData name="Piet R." userId="d5a61a8c4b1a1e6c" providerId="LiveId" clId="{308A495C-14FA-4395-A08C-1DD6C0A4BB0B}" dt="2022-12-25T23:11:16.648" v="0"/>
-            <ac:spMkLst>
-              <pc:docMk/>
-              <pc:sldMasterMk cId="1692767427" sldId="2147483650"/>
-              <pc:sldLayoutMk cId="3349558861" sldId="2147483651"/>
-              <ac:spMk id="3" creationId="{00000000-0000-0000-0000-000000000000}"/>
-            </ac:spMkLst>
-          </pc:spChg>
-        </pc:sldLayoutChg>
-        <pc:sldLayoutChg chg="modSp">
-          <pc:chgData name="Piet R." userId="d5a61a8c4b1a1e6c" providerId="LiveId" clId="{308A495C-14FA-4395-A08C-1DD6C0A4BB0B}" dt="2022-12-25T23:11:16.648" v="0"/>
-          <pc:sldLayoutMkLst>
-            <pc:docMk/>
-            <pc:sldMasterMk cId="1692767427" sldId="2147483650"/>
-            <pc:sldLayoutMk cId="190269264" sldId="2147483653"/>
-          </pc:sldLayoutMkLst>
-          <pc:spChg chg="mod">
-            <ac:chgData name="Piet R." userId="d5a61a8c4b1a1e6c" providerId="LiveId" clId="{308A495C-14FA-4395-A08C-1DD6C0A4BB0B}" dt="2022-12-25T23:11:16.648" v="0"/>
-            <ac:spMkLst>
-              <pc:docMk/>
-              <pc:sldMasterMk cId="1692767427" sldId="2147483650"/>
-              <pc:sldLayoutMk cId="190269264" sldId="2147483653"/>
-              <ac:spMk id="2" creationId="{00000000-0000-0000-0000-000000000000}"/>
-            </ac:spMkLst>
-          </pc:spChg>
-          <pc:spChg chg="mod">
-            <ac:chgData name="Piet R." userId="d5a61a8c4b1a1e6c" providerId="LiveId" clId="{308A495C-14FA-4395-A08C-1DD6C0A4BB0B}" dt="2022-12-25T23:11:16.648" v="0"/>
-            <ac:spMkLst>
-              <pc:docMk/>
-              <pc:sldMasterMk cId="1692767427" sldId="2147483650"/>
-              <pc:sldLayoutMk cId="190269264" sldId="2147483653"/>
-              <ac:spMk id="3" creationId="{00000000-0000-0000-0000-000000000000}"/>
-            </ac:spMkLst>
-          </pc:spChg>
-        </pc:sldLayoutChg>
-        <pc:sldLayoutChg chg="modSp">
-          <pc:chgData name="Piet R." userId="d5a61a8c4b1a1e6c" providerId="LiveId" clId="{308A495C-14FA-4395-A08C-1DD6C0A4BB0B}" dt="2022-12-25T23:11:16.648" v="0"/>
-          <pc:sldLayoutMkLst>
-            <pc:docMk/>
-            <pc:sldMasterMk cId="1692767427" sldId="2147483650"/>
-            <pc:sldLayoutMk cId="2862865859" sldId="2147483654"/>
-          </pc:sldLayoutMkLst>
-          <pc:spChg chg="mod">
-            <ac:chgData name="Piet R." userId="d5a61a8c4b1a1e6c" providerId="LiveId" clId="{308A495C-14FA-4395-A08C-1DD6C0A4BB0B}" dt="2022-12-25T23:11:16.648" v="0"/>
-            <ac:spMkLst>
-              <pc:docMk/>
-              <pc:sldMasterMk cId="1692767427" sldId="2147483650"/>
-              <pc:sldLayoutMk cId="2862865859" sldId="2147483654"/>
-              <ac:spMk id="3" creationId="{00000000-0000-0000-0000-000000000000}"/>
-            </ac:spMkLst>
-          </pc:spChg>
-          <pc:spChg chg="mod">
-            <ac:chgData name="Piet R." userId="d5a61a8c4b1a1e6c" providerId="LiveId" clId="{308A495C-14FA-4395-A08C-1DD6C0A4BB0B}" dt="2022-12-25T23:11:16.648" v="0"/>
-            <ac:spMkLst>
-              <pc:docMk/>
-              <pc:sldMasterMk cId="1692767427" sldId="2147483650"/>
-              <pc:sldLayoutMk cId="2862865859" sldId="2147483654"/>
-              <ac:spMk id="4" creationId="{00000000-0000-0000-0000-000000000000}"/>
-            </ac:spMkLst>
-          </pc:spChg>
-        </pc:sldLayoutChg>
-        <pc:sldLayoutChg chg="modSp">
-          <pc:chgData name="Piet R." userId="d5a61a8c4b1a1e6c" providerId="LiveId" clId="{308A495C-14FA-4395-A08C-1DD6C0A4BB0B}" dt="2022-12-25T23:11:16.648" v="0"/>
-          <pc:sldLayoutMkLst>
-            <pc:docMk/>
-            <pc:sldMasterMk cId="1692767427" sldId="2147483650"/>
-            <pc:sldLayoutMk cId="3412309386" sldId="2147483655"/>
-          </pc:sldLayoutMkLst>
-          <pc:spChg chg="mod">
-            <ac:chgData name="Piet R." userId="d5a61a8c4b1a1e6c" providerId="LiveId" clId="{308A495C-14FA-4395-A08C-1DD6C0A4BB0B}" dt="2022-12-25T23:11:16.648" v="0"/>
-            <ac:spMkLst>
-              <pc:docMk/>
-              <pc:sldMasterMk cId="1692767427" sldId="2147483650"/>
-              <pc:sldLayoutMk cId="3412309386" sldId="2147483655"/>
-              <ac:spMk id="2" creationId="{00000000-0000-0000-0000-000000000000}"/>
-            </ac:spMkLst>
-          </pc:spChg>
-          <pc:spChg chg="mod">
-            <ac:chgData name="Piet R." userId="d5a61a8c4b1a1e6c" providerId="LiveId" clId="{308A495C-14FA-4395-A08C-1DD6C0A4BB0B}" dt="2022-12-25T23:11:16.648" v="0"/>
-            <ac:spMkLst>
-              <pc:docMk/>
-              <pc:sldMasterMk cId="1692767427" sldId="2147483650"/>
-              <pc:sldLayoutMk cId="3412309386" sldId="2147483655"/>
-              <ac:spMk id="3" creationId="{00000000-0000-0000-0000-000000000000}"/>
-            </ac:spMkLst>
-          </pc:spChg>
-          <pc:spChg chg="mod">
-            <ac:chgData name="Piet R." userId="d5a61a8c4b1a1e6c" providerId="LiveId" clId="{308A495C-14FA-4395-A08C-1DD6C0A4BB0B}" dt="2022-12-25T23:11:16.648" v="0"/>
-            <ac:spMkLst>
-              <pc:docMk/>
-              <pc:sldMasterMk cId="1692767427" sldId="2147483650"/>
-              <pc:sldLayoutMk cId="3412309386" sldId="2147483655"/>
-              <ac:spMk id="4" creationId="{00000000-0000-0000-0000-000000000000}"/>
-            </ac:spMkLst>
-          </pc:spChg>
-          <pc:spChg chg="mod">
-            <ac:chgData name="Piet R." userId="d5a61a8c4b1a1e6c" providerId="LiveId" clId="{308A495C-14FA-4395-A08C-1DD6C0A4BB0B}" dt="2022-12-25T23:11:16.648" v="0"/>
-            <ac:spMkLst>
-              <pc:docMk/>
-              <pc:sldMasterMk cId="1692767427" sldId="2147483650"/>
-              <pc:sldLayoutMk cId="3412309386" sldId="2147483655"/>
-              <ac:spMk id="5" creationId="{00000000-0000-0000-0000-000000000000}"/>
-            </ac:spMkLst>
-          </pc:spChg>
-          <pc:spChg chg="mod">
-            <ac:chgData name="Piet R." userId="d5a61a8c4b1a1e6c" providerId="LiveId" clId="{308A495C-14FA-4395-A08C-1DD6C0A4BB0B}" dt="2022-12-25T23:11:16.648" v="0"/>
-            <ac:spMkLst>
-              <pc:docMk/>
-              <pc:sldMasterMk cId="1692767427" sldId="2147483650"/>
-              <pc:sldLayoutMk cId="3412309386" sldId="2147483655"/>
-              <ac:spMk id="6" creationId="{00000000-0000-0000-0000-000000000000}"/>
-            </ac:spMkLst>
-          </pc:spChg>
-        </pc:sldLayoutChg>
-        <pc:sldLayoutChg chg="modSp">
-          <pc:chgData name="Piet R." userId="d5a61a8c4b1a1e6c" providerId="LiveId" clId="{308A495C-14FA-4395-A08C-1DD6C0A4BB0B}" dt="2022-12-25T23:11:16.648" v="0"/>
-          <pc:sldLayoutMkLst>
-            <pc:docMk/>
-            <pc:sldMasterMk cId="1692767427" sldId="2147483650"/>
-            <pc:sldLayoutMk cId="956224019" sldId="2147483658"/>
-          </pc:sldLayoutMkLst>
-          <pc:spChg chg="mod">
-            <ac:chgData name="Piet R." userId="d5a61a8c4b1a1e6c" providerId="LiveId" clId="{308A495C-14FA-4395-A08C-1DD6C0A4BB0B}" dt="2022-12-25T23:11:16.648" v="0"/>
-            <ac:spMkLst>
-              <pc:docMk/>
-              <pc:sldMasterMk cId="1692767427" sldId="2147483650"/>
-              <pc:sldLayoutMk cId="956224019" sldId="2147483658"/>
-              <ac:spMk id="2" creationId="{00000000-0000-0000-0000-000000000000}"/>
-            </ac:spMkLst>
-          </pc:spChg>
-          <pc:spChg chg="mod">
-            <ac:chgData name="Piet R." userId="d5a61a8c4b1a1e6c" providerId="LiveId" clId="{308A495C-14FA-4395-A08C-1DD6C0A4BB0B}" dt="2022-12-25T23:11:16.648" v="0"/>
-            <ac:spMkLst>
-              <pc:docMk/>
-              <pc:sldMasterMk cId="1692767427" sldId="2147483650"/>
-              <pc:sldLayoutMk cId="956224019" sldId="2147483658"/>
-              <ac:spMk id="3" creationId="{00000000-0000-0000-0000-000000000000}"/>
-            </ac:spMkLst>
-          </pc:spChg>
-          <pc:spChg chg="mod">
-            <ac:chgData name="Piet R." userId="d5a61a8c4b1a1e6c" providerId="LiveId" clId="{308A495C-14FA-4395-A08C-1DD6C0A4BB0B}" dt="2022-12-25T23:11:16.648" v="0"/>
-            <ac:spMkLst>
-              <pc:docMk/>
-              <pc:sldMasterMk cId="1692767427" sldId="2147483650"/>
-              <pc:sldLayoutMk cId="956224019" sldId="2147483658"/>
-              <ac:spMk id="4" creationId="{00000000-0000-0000-0000-000000000000}"/>
-            </ac:spMkLst>
-          </pc:spChg>
-        </pc:sldLayoutChg>
-        <pc:sldLayoutChg chg="modSp">
-          <pc:chgData name="Piet R." userId="d5a61a8c4b1a1e6c" providerId="LiveId" clId="{308A495C-14FA-4395-A08C-1DD6C0A4BB0B}" dt="2022-12-25T23:11:16.648" v="0"/>
-          <pc:sldLayoutMkLst>
-            <pc:docMk/>
-            <pc:sldMasterMk cId="1692767427" sldId="2147483650"/>
-            <pc:sldLayoutMk cId="3152744562" sldId="2147483659"/>
-          </pc:sldLayoutMkLst>
-          <pc:spChg chg="mod">
-            <ac:chgData name="Piet R." userId="d5a61a8c4b1a1e6c" providerId="LiveId" clId="{308A495C-14FA-4395-A08C-1DD6C0A4BB0B}" dt="2022-12-25T23:11:16.648" v="0"/>
-            <ac:spMkLst>
-              <pc:docMk/>
-              <pc:sldMasterMk cId="1692767427" sldId="2147483650"/>
-              <pc:sldLayoutMk cId="3152744562" sldId="2147483659"/>
-              <ac:spMk id="2" creationId="{00000000-0000-0000-0000-000000000000}"/>
-            </ac:spMkLst>
-          </pc:spChg>
-          <pc:spChg chg="mod">
-            <ac:chgData name="Piet R." userId="d5a61a8c4b1a1e6c" providerId="LiveId" clId="{308A495C-14FA-4395-A08C-1DD6C0A4BB0B}" dt="2022-12-25T23:11:16.648" v="0"/>
-            <ac:spMkLst>
-              <pc:docMk/>
-              <pc:sldMasterMk cId="1692767427" sldId="2147483650"/>
-              <pc:sldLayoutMk cId="3152744562" sldId="2147483659"/>
-              <ac:spMk id="3" creationId="{00000000-0000-0000-0000-000000000000}"/>
-            </ac:spMkLst>
-          </pc:spChg>
-          <pc:spChg chg="mod">
-            <ac:chgData name="Piet R." userId="d5a61a8c4b1a1e6c" providerId="LiveId" clId="{308A495C-14FA-4395-A08C-1DD6C0A4BB0B}" dt="2022-12-25T23:11:16.648" v="0"/>
-            <ac:spMkLst>
-              <pc:docMk/>
-              <pc:sldMasterMk cId="1692767427" sldId="2147483650"/>
-              <pc:sldLayoutMk cId="3152744562" sldId="2147483659"/>
-              <ac:spMk id="4" creationId="{00000000-0000-0000-0000-000000000000}"/>
-            </ac:spMkLst>
-          </pc:spChg>
-        </pc:sldLayoutChg>
-        <pc:sldLayoutChg chg="modSp">
-          <pc:chgData name="Piet R." userId="d5a61a8c4b1a1e6c" providerId="LiveId" clId="{308A495C-14FA-4395-A08C-1DD6C0A4BB0B}" dt="2022-12-25T23:11:16.648" v="0"/>
-          <pc:sldLayoutMkLst>
-            <pc:docMk/>
-            <pc:sldMasterMk cId="1692767427" sldId="2147483650"/>
-            <pc:sldLayoutMk cId="1892888541" sldId="2147483661"/>
-          </pc:sldLayoutMkLst>
-          <pc:spChg chg="mod">
-            <ac:chgData name="Piet R." userId="d5a61a8c4b1a1e6c" providerId="LiveId" clId="{308A495C-14FA-4395-A08C-1DD6C0A4BB0B}" dt="2022-12-25T23:11:16.648" v="0"/>
-            <ac:spMkLst>
-              <pc:docMk/>
-              <pc:sldMasterMk cId="1692767427" sldId="2147483650"/>
-              <pc:sldLayoutMk cId="1892888541" sldId="2147483661"/>
-              <ac:spMk id="2" creationId="{00000000-0000-0000-0000-000000000000}"/>
-            </ac:spMkLst>
-          </pc:spChg>
-          <pc:spChg chg="mod">
-            <ac:chgData name="Piet R." userId="d5a61a8c4b1a1e6c" providerId="LiveId" clId="{308A495C-14FA-4395-A08C-1DD6C0A4BB0B}" dt="2022-12-25T23:11:16.648" v="0"/>
-            <ac:spMkLst>
-              <pc:docMk/>
-              <pc:sldMasterMk cId="1692767427" sldId="2147483650"/>
-              <pc:sldLayoutMk cId="1892888541" sldId="2147483661"/>
-              <ac:spMk id="3" creationId="{00000000-0000-0000-0000-000000000000}"/>
-            </ac:spMkLst>
-          </pc:spChg>
-        </pc:sldLayoutChg>
-      </pc:sldMasterChg>
+            <pc:sldMk cId="3363793898" sldId="256"/>
+            <ac:grpSpMk id="2" creationId="{EF74904A-E855-4B9F-882F-5552A1D1A8B4}"/>
+          </ac:grpSpMkLst>
+        </pc:grpChg>
+      </pc:sldChg>
     </pc:docChg>
   </pc:docChgLst>
   <pc:docChgLst>
     <pc:chgData name="Piet R." userId="d5a61a8c4b1a1e6c" providerId="LiveId" clId="{069C6BB7-1499-4A3D-86AC-091008B7885A}"/>
-    <pc:docChg chg="undo custSel addSld modSld">
-      <pc:chgData name="Piet R." userId="d5a61a8c4b1a1e6c" providerId="LiveId" clId="{069C6BB7-1499-4A3D-86AC-091008B7885A}" dt="2022-12-03T13:48:08.429" v="85" actId="255"/>
+    <pc:docChg chg="custSel addSld modSld">
+      <pc:chgData name="Piet R." userId="d5a61a8c4b1a1e6c" providerId="LiveId" clId="{069C6BB7-1499-4A3D-86AC-091008B7885A}" dt="2022-12-03T13:36:08.167" v="79" actId="113"/>
       <pc:docMkLst>
         <pc:docMk/>
       </pc:docMkLst>
       <pc:sldChg chg="addSp delSp modSp new mod">
-        <pc:chgData name="Piet R." userId="d5a61a8c4b1a1e6c" providerId="LiveId" clId="{069C6BB7-1499-4A3D-86AC-091008B7885A}" dt="2022-12-03T13:48:08.429" v="85" actId="255"/>
+        <pc:chgData name="Piet R." userId="d5a61a8c4b1a1e6c" providerId="LiveId" clId="{069C6BB7-1499-4A3D-86AC-091008B7885A}" dt="2022-12-03T13:36:08.167" v="79" actId="113"/>
         <pc:sldMkLst>
           <pc:docMk/>
           <pc:sldMk cId="3363793898" sldId="256"/>
@@ -461,7 +203,7 @@
           </ac:spMkLst>
         </pc:spChg>
         <pc:spChg chg="add mod">
-          <ac:chgData name="Piet R." userId="d5a61a8c4b1a1e6c" providerId="LiveId" clId="{069C6BB7-1499-4A3D-86AC-091008B7885A}" dt="2022-12-03T13:48:08.429" v="85" actId="255"/>
+          <ac:chgData name="Piet R." userId="d5a61a8c4b1a1e6c" providerId="LiveId" clId="{069C6BB7-1499-4A3D-86AC-091008B7885A}" dt="2022-12-03T13:36:08.167" v="79" actId="113"/>
           <ac:spMkLst>
             <pc:docMk/>
             <pc:sldMk cId="3363793898" sldId="256"/>
@@ -469,7 +211,7 @@
           </ac:spMkLst>
         </pc:spChg>
         <pc:picChg chg="add mod">
-          <ac:chgData name="Piet R." userId="d5a61a8c4b1a1e6c" providerId="LiveId" clId="{069C6BB7-1499-4A3D-86AC-091008B7885A}" dt="2022-12-03T13:47:56.874" v="83" actId="14100"/>
+          <ac:chgData name="Piet R." userId="d5a61a8c4b1a1e6c" providerId="LiveId" clId="{069C6BB7-1499-4A3D-86AC-091008B7885A}" dt="2022-12-03T13:31:12.187" v="10" actId="14100"/>
           <ac:picMkLst>
             <pc:docMk/>
             <pc:sldMk cId="3363793898" sldId="256"/>
@@ -505,22 +247,22 @@
   <pc:docChgLst>
     <pc:chgData name="Piet R." userId="d5a61a8c4b1a1e6c" providerId="LiveId" clId="{C708EAD4-EB8D-4667-B7C1-40C300BDB23C}"/>
     <pc:docChg chg="modSld">
-      <pc:chgData name="Piet R." userId="d5a61a8c4b1a1e6c" providerId="LiveId" clId="{C708EAD4-EB8D-4667-B7C1-40C300BDB23C}" dt="2022-12-25T23:24:53.944" v="22" actId="207"/>
+      <pc:chgData name="Piet R." userId="d5a61a8c4b1a1e6c" providerId="LiveId" clId="{C708EAD4-EB8D-4667-B7C1-40C300BDB23C}" dt="2022-12-27T19:57:18.048" v="20" actId="20577"/>
       <pc:docMkLst>
         <pc:docMk/>
       </pc:docMkLst>
       <pc:sldChg chg="modSp mod">
-        <pc:chgData name="Piet R." userId="d5a61a8c4b1a1e6c" providerId="LiveId" clId="{C708EAD4-EB8D-4667-B7C1-40C300BDB23C}" dt="2022-12-25T23:24:53.944" v="22" actId="207"/>
+        <pc:chgData name="Piet R." userId="d5a61a8c4b1a1e6c" providerId="LiveId" clId="{C708EAD4-EB8D-4667-B7C1-40C300BDB23C}" dt="2022-12-27T19:57:18.048" v="20" actId="20577"/>
         <pc:sldMkLst>
           <pc:docMk/>
           <pc:sldMk cId="3363793898" sldId="256"/>
         </pc:sldMkLst>
         <pc:spChg chg="mod">
-          <ac:chgData name="Piet R." userId="d5a61a8c4b1a1e6c" providerId="LiveId" clId="{C708EAD4-EB8D-4667-B7C1-40C300BDB23C}" dt="2022-12-25T23:24:53.944" v="22" actId="207"/>
+          <ac:chgData name="Piet R." userId="d5a61a8c4b1a1e6c" providerId="LiveId" clId="{C708EAD4-EB8D-4667-B7C1-40C300BDB23C}" dt="2022-12-27T19:57:18.048" v="20" actId="20577"/>
           <ac:spMkLst>
             <pc:docMk/>
             <pc:sldMk cId="3363793898" sldId="256"/>
-            <ac:spMk id="6" creationId="{49B9353A-ADA8-405F-99B6-B67506CD4EB7}"/>
+            <ac:spMk id="7" creationId="{6A8B9C31-6771-4864-919E-7D5534589030}"/>
           </ac:spMkLst>
         </pc:spChg>
       </pc:sldChg>
@@ -558,8 +300,8 @@
         </p:nvSpPr>
         <p:spPr>
           <a:xfrm>
-            <a:off x="3825081" y="499088"/>
-            <a:ext cx="22950488" cy="1061708"/>
+            <a:off x="1524199" y="499088"/>
+            <a:ext cx="9145191" cy="1061708"/>
           </a:xfrm>
         </p:spPr>
         <p:txBody>
@@ -590,8 +332,8 @@
         </p:nvSpPr>
         <p:spPr>
           <a:xfrm>
-            <a:off x="3825081" y="1601740"/>
-            <a:ext cx="22950488" cy="736278"/>
+            <a:off x="1524199" y="1601740"/>
+            <a:ext cx="9145191" cy="736278"/>
           </a:xfrm>
         </p:spPr>
         <p:txBody>
@@ -659,8 +401,8 @@
           <a:lstStyle/>
           <a:p>
             <a:fld id="{C764DE79-268F-4C1A-8933-263129D2AF90}" type="datetimeFigureOut">
-              <a:rPr lang="en-US" smtClean="0"/>
-              <a:t>12/26/2022</a:t>
+              <a:rPr lang="en-US" dirty="0"/>
+              <a:t>12/27/2022</a:t>
             </a:fld>
             <a:endParaRPr lang="en-US" dirty="0"/>
           </a:p>
@@ -701,7 +443,7 @@
           <a:lstStyle/>
           <a:p>
             <a:fld id="{48F63A3B-78C7-47BE-AE5E-E10140E04643}" type="slidenum">
-              <a:rPr lang="en-US" smtClean="0"/>
+              <a:rPr lang="en-US" dirty="0"/>
               <a:t>‹Nr.›</a:t>
             </a:fld>
             <a:endParaRPr lang="en-US" dirty="0"/>
@@ -711,7 +453,7 @@
     </p:spTree>
     <p:extLst>
       <p:ext uri="{BB962C8B-B14F-4D97-AF65-F5344CB8AC3E}">
-        <p14:creationId xmlns:p14="http://schemas.microsoft.com/office/powerpoint/2010/main" val="4059209446"/>
+        <p14:creationId xmlns:p14="http://schemas.microsoft.com/office/powerpoint/2010/main" val="3349558861"/>
       </p:ext>
     </p:extLst>
   </p:cSld>
@@ -829,8 +571,8 @@
           <a:lstStyle/>
           <a:p>
             <a:fld id="{C764DE79-268F-4C1A-8933-263129D2AF90}" type="datetimeFigureOut">
-              <a:rPr lang="en-US" smtClean="0"/>
-              <a:t>12/26/2022</a:t>
+              <a:rPr lang="en-US" dirty="0"/>
+              <a:t>12/27/2022</a:t>
             </a:fld>
             <a:endParaRPr lang="en-US" dirty="0"/>
           </a:p>
@@ -871,7 +613,7 @@
           <a:lstStyle/>
           <a:p>
             <a:fld id="{48F63A3B-78C7-47BE-AE5E-E10140E04643}" type="slidenum">
-              <a:rPr lang="en-US" smtClean="0"/>
+              <a:rPr lang="en-US" dirty="0"/>
               <a:t>‹Nr.›</a:t>
             </a:fld>
             <a:endParaRPr lang="en-US" dirty="0"/>
@@ -881,7 +623,7 @@
     </p:spTree>
     <p:extLst>
       <p:ext uri="{BB962C8B-B14F-4D97-AF65-F5344CB8AC3E}">
-        <p14:creationId xmlns:p14="http://schemas.microsoft.com/office/powerpoint/2010/main" val="2305128120"/>
+        <p14:creationId xmlns:p14="http://schemas.microsoft.com/office/powerpoint/2010/main" val="770862968"/>
       </p:ext>
     </p:extLst>
   </p:cSld>
@@ -920,8 +662,8 @@
         </p:nvSpPr>
         <p:spPr>
           <a:xfrm>
-            <a:off x="21898590" y="162362"/>
-            <a:ext cx="6598265" cy="2584385"/>
+            <a:off x="8726037" y="162362"/>
+            <a:ext cx="2629242" cy="2584385"/>
           </a:xfrm>
         </p:spPr>
         <p:txBody>
@@ -948,8 +690,8 @@
         </p:nvSpPr>
         <p:spPr>
           <a:xfrm>
-            <a:off x="2103795" y="162362"/>
-            <a:ext cx="19412287" cy="2584385"/>
+            <a:off x="838309" y="162362"/>
+            <a:ext cx="7735307" cy="2584385"/>
           </a:xfrm>
         </p:spPr>
         <p:txBody>
@@ -1009,8 +751,8 @@
           <a:lstStyle/>
           <a:p>
             <a:fld id="{C764DE79-268F-4C1A-8933-263129D2AF90}" type="datetimeFigureOut">
-              <a:rPr lang="en-US" smtClean="0"/>
-              <a:t>12/26/2022</a:t>
+              <a:rPr lang="en-US" dirty="0"/>
+              <a:t>12/27/2022</a:t>
             </a:fld>
             <a:endParaRPr lang="en-US" dirty="0"/>
           </a:p>
@@ -1051,7 +793,7 @@
           <a:lstStyle/>
           <a:p>
             <a:fld id="{48F63A3B-78C7-47BE-AE5E-E10140E04643}" type="slidenum">
-              <a:rPr lang="en-US" smtClean="0"/>
+              <a:rPr lang="en-US" dirty="0"/>
               <a:t>‹Nr.›</a:t>
             </a:fld>
             <a:endParaRPr lang="en-US" dirty="0"/>
@@ -1061,7 +803,7 @@
     </p:spTree>
     <p:extLst>
       <p:ext uri="{BB962C8B-B14F-4D97-AF65-F5344CB8AC3E}">
-        <p14:creationId xmlns:p14="http://schemas.microsoft.com/office/powerpoint/2010/main" val="530659657"/>
+        <p14:creationId xmlns:p14="http://schemas.microsoft.com/office/powerpoint/2010/main" val="1892888541"/>
       </p:ext>
     </p:extLst>
   </p:cSld>
@@ -1179,8 +921,8 @@
           <a:lstStyle/>
           <a:p>
             <a:fld id="{C764DE79-268F-4C1A-8933-263129D2AF90}" type="datetimeFigureOut">
-              <a:rPr lang="en-US" smtClean="0"/>
-              <a:t>12/26/2022</a:t>
+              <a:rPr lang="en-US" dirty="0"/>
+              <a:t>12/27/2022</a:t>
             </a:fld>
             <a:endParaRPr lang="en-US" dirty="0"/>
           </a:p>
@@ -1221,7 +963,7 @@
           <a:lstStyle/>
           <a:p>
             <a:fld id="{48F63A3B-78C7-47BE-AE5E-E10140E04643}" type="slidenum">
-              <a:rPr lang="en-US" smtClean="0"/>
+              <a:rPr lang="en-US" dirty="0"/>
               <a:t>‹Nr.›</a:t>
             </a:fld>
             <a:endParaRPr lang="en-US" dirty="0"/>
@@ -1231,7 +973,7 @@
     </p:spTree>
     <p:extLst>
       <p:ext uri="{BB962C8B-B14F-4D97-AF65-F5344CB8AC3E}">
-        <p14:creationId xmlns:p14="http://schemas.microsoft.com/office/powerpoint/2010/main" val="4027970762"/>
+        <p14:creationId xmlns:p14="http://schemas.microsoft.com/office/powerpoint/2010/main" val="1719446924"/>
       </p:ext>
     </p:extLst>
   </p:cSld>
@@ -1270,8 +1012,8 @@
         </p:nvSpPr>
         <p:spPr>
           <a:xfrm>
-            <a:off x="2087857" y="760280"/>
-            <a:ext cx="26393061" cy="1268544"/>
+            <a:off x="831958" y="760280"/>
+            <a:ext cx="10516970" cy="1268544"/>
           </a:xfrm>
         </p:spPr>
         <p:txBody>
@@ -1302,8 +1044,8 @@
         </p:nvSpPr>
         <p:spPr>
           <a:xfrm>
-            <a:off x="2087857" y="2040824"/>
-            <a:ext cx="26393061" cy="667097"/>
+            <a:off x="831958" y="2040824"/>
+            <a:ext cx="10516970" cy="667097"/>
           </a:xfrm>
         </p:spPr>
         <p:txBody>
@@ -1425,8 +1167,8 @@
           <a:lstStyle/>
           <a:p>
             <a:fld id="{C764DE79-268F-4C1A-8933-263129D2AF90}" type="datetimeFigureOut">
-              <a:rPr lang="en-US" smtClean="0"/>
-              <a:t>12/26/2022</a:t>
+              <a:rPr lang="en-US" dirty="0"/>
+              <a:t>12/27/2022</a:t>
             </a:fld>
             <a:endParaRPr lang="en-US" dirty="0"/>
           </a:p>
@@ -1467,7 +1209,7 @@
           <a:lstStyle/>
           <a:p>
             <a:fld id="{48F63A3B-78C7-47BE-AE5E-E10140E04643}" type="slidenum">
-              <a:rPr lang="en-US" smtClean="0"/>
+              <a:rPr lang="en-US" dirty="0"/>
               <a:t>‹Nr.›</a:t>
             </a:fld>
             <a:endParaRPr lang="en-US" dirty="0"/>
@@ -1477,7 +1219,7 @@
     </p:spTree>
     <p:extLst>
       <p:ext uri="{BB962C8B-B14F-4D97-AF65-F5344CB8AC3E}">
-        <p14:creationId xmlns:p14="http://schemas.microsoft.com/office/powerpoint/2010/main" val="157452466"/>
+        <p14:creationId xmlns:p14="http://schemas.microsoft.com/office/powerpoint/2010/main" val="190269264"/>
       </p:ext>
     </p:extLst>
   </p:cSld>
@@ -1539,8 +1281,8 @@
         </p:nvSpPr>
         <p:spPr>
           <a:xfrm>
-            <a:off x="2103795" y="811811"/>
-            <a:ext cx="13005276" cy="1934936"/>
+            <a:off x="838309" y="811811"/>
+            <a:ext cx="5182275" cy="1934936"/>
           </a:xfrm>
         </p:spPr>
         <p:txBody>
@@ -1596,8 +1338,8 @@
         </p:nvSpPr>
         <p:spPr>
           <a:xfrm>
-            <a:off x="15491579" y="811811"/>
-            <a:ext cx="13005276" cy="1934936"/>
+            <a:off x="6173004" y="811811"/>
+            <a:ext cx="5182275" cy="1934936"/>
           </a:xfrm>
         </p:spPr>
         <p:txBody>
@@ -1657,8 +1399,8 @@
           <a:lstStyle/>
           <a:p>
             <a:fld id="{C764DE79-268F-4C1A-8933-263129D2AF90}" type="datetimeFigureOut">
-              <a:rPr lang="en-US" smtClean="0"/>
-              <a:t>12/26/2022</a:t>
+              <a:rPr lang="en-US" dirty="0"/>
+              <a:t>12/27/2022</a:t>
             </a:fld>
             <a:endParaRPr lang="en-US" dirty="0"/>
           </a:p>
@@ -1699,7 +1441,7 @@
           <a:lstStyle/>
           <a:p>
             <a:fld id="{48F63A3B-78C7-47BE-AE5E-E10140E04643}" type="slidenum">
-              <a:rPr lang="en-US" smtClean="0"/>
+              <a:rPr lang="en-US" dirty="0"/>
               <a:t>‹Nr.›</a:t>
             </a:fld>
             <a:endParaRPr lang="en-US" dirty="0"/>
@@ -1709,7 +1451,7 @@
     </p:spTree>
     <p:extLst>
       <p:ext uri="{BB962C8B-B14F-4D97-AF65-F5344CB8AC3E}">
-        <p14:creationId xmlns:p14="http://schemas.microsoft.com/office/powerpoint/2010/main" val="4187654792"/>
+        <p14:creationId xmlns:p14="http://schemas.microsoft.com/office/powerpoint/2010/main" val="2862865859"/>
       </p:ext>
     </p:extLst>
   </p:cSld>
@@ -1748,8 +1490,8 @@
         </p:nvSpPr>
         <p:spPr>
           <a:xfrm>
-            <a:off x="2107780" y="162363"/>
-            <a:ext cx="26393061" cy="589446"/>
+            <a:off x="839897" y="162363"/>
+            <a:ext cx="10516970" cy="589446"/>
           </a:xfrm>
         </p:spPr>
         <p:txBody>
@@ -1776,8 +1518,8 @@
         </p:nvSpPr>
         <p:spPr>
           <a:xfrm>
-            <a:off x="2107782" y="747573"/>
-            <a:ext cx="12945508" cy="366374"/>
+            <a:off x="839898" y="747573"/>
+            <a:ext cx="5158459" cy="366374"/>
           </a:xfrm>
         </p:spPr>
         <p:txBody>
@@ -1841,8 +1583,8 @@
         </p:nvSpPr>
         <p:spPr>
           <a:xfrm>
-            <a:off x="2107782" y="1113947"/>
-            <a:ext cx="12945508" cy="1638448"/>
+            <a:off x="839898" y="1113947"/>
+            <a:ext cx="5158459" cy="1638448"/>
           </a:xfrm>
         </p:spPr>
         <p:txBody>
@@ -1898,8 +1640,8 @@
         </p:nvSpPr>
         <p:spPr>
           <a:xfrm>
-            <a:off x="15491579" y="747573"/>
-            <a:ext cx="13009262" cy="366374"/>
+            <a:off x="6173004" y="747573"/>
+            <a:ext cx="5183863" cy="366374"/>
           </a:xfrm>
         </p:spPr>
         <p:txBody>
@@ -1963,8 +1705,8 @@
         </p:nvSpPr>
         <p:spPr>
           <a:xfrm>
-            <a:off x="15491579" y="1113947"/>
-            <a:ext cx="13009262" cy="1638448"/>
+            <a:off x="6173004" y="1113947"/>
+            <a:ext cx="5183863" cy="1638448"/>
           </a:xfrm>
         </p:spPr>
         <p:txBody>
@@ -2024,8 +1766,8 @@
           <a:lstStyle/>
           <a:p>
             <a:fld id="{C764DE79-268F-4C1A-8933-263129D2AF90}" type="datetimeFigureOut">
-              <a:rPr lang="en-US" smtClean="0"/>
-              <a:t>12/26/2022</a:t>
+              <a:rPr lang="en-US" dirty="0"/>
+              <a:t>12/27/2022</a:t>
             </a:fld>
             <a:endParaRPr lang="en-US" dirty="0"/>
           </a:p>
@@ -2066,7 +1808,7 @@
           <a:lstStyle/>
           <a:p>
             <a:fld id="{48F63A3B-78C7-47BE-AE5E-E10140E04643}" type="slidenum">
-              <a:rPr lang="en-US" smtClean="0"/>
+              <a:rPr lang="en-US" dirty="0"/>
               <a:t>‹Nr.›</a:t>
             </a:fld>
             <a:endParaRPr lang="en-US" dirty="0"/>
@@ -2076,7 +1818,7 @@
     </p:spTree>
     <p:extLst>
       <p:ext uri="{BB962C8B-B14F-4D97-AF65-F5344CB8AC3E}">
-        <p14:creationId xmlns:p14="http://schemas.microsoft.com/office/powerpoint/2010/main" val="103424267"/>
+        <p14:creationId xmlns:p14="http://schemas.microsoft.com/office/powerpoint/2010/main" val="3412309386"/>
       </p:ext>
     </p:extLst>
   </p:cSld>
@@ -2142,8 +1884,8 @@
           <a:lstStyle/>
           <a:p>
             <a:fld id="{C764DE79-268F-4C1A-8933-263129D2AF90}" type="datetimeFigureOut">
-              <a:rPr lang="en-US" smtClean="0"/>
-              <a:t>12/26/2022</a:t>
+              <a:rPr lang="en-US" dirty="0"/>
+              <a:t>12/27/2022</a:t>
             </a:fld>
             <a:endParaRPr lang="en-US" dirty="0"/>
           </a:p>
@@ -2184,7 +1926,7 @@
           <a:lstStyle/>
           <a:p>
             <a:fld id="{48F63A3B-78C7-47BE-AE5E-E10140E04643}" type="slidenum">
-              <a:rPr lang="en-US" smtClean="0"/>
+              <a:rPr lang="en-US" dirty="0"/>
               <a:t>‹Nr.›</a:t>
             </a:fld>
             <a:endParaRPr lang="en-US" dirty="0"/>
@@ -2194,7 +1936,7 @@
     </p:spTree>
     <p:extLst>
       <p:ext uri="{BB962C8B-B14F-4D97-AF65-F5344CB8AC3E}">
-        <p14:creationId xmlns:p14="http://schemas.microsoft.com/office/powerpoint/2010/main" val="2849641958"/>
+        <p14:creationId xmlns:p14="http://schemas.microsoft.com/office/powerpoint/2010/main" val="4072955182"/>
       </p:ext>
     </p:extLst>
   </p:cSld>
@@ -2237,8 +1979,8 @@
           <a:lstStyle/>
           <a:p>
             <a:fld id="{C764DE79-268F-4C1A-8933-263129D2AF90}" type="datetimeFigureOut">
-              <a:rPr lang="en-US" smtClean="0"/>
-              <a:t>12/26/2022</a:t>
+              <a:rPr lang="en-US" dirty="0"/>
+              <a:t>12/27/2022</a:t>
             </a:fld>
             <a:endParaRPr lang="en-US" dirty="0"/>
           </a:p>
@@ -2279,7 +2021,7 @@
           <a:lstStyle/>
           <a:p>
             <a:fld id="{48F63A3B-78C7-47BE-AE5E-E10140E04643}" type="slidenum">
-              <a:rPr lang="en-US" smtClean="0"/>
+              <a:rPr lang="en-US" dirty="0"/>
               <a:t>‹Nr.›</a:t>
             </a:fld>
             <a:endParaRPr lang="en-US" dirty="0"/>
@@ -2289,7 +2031,7 @@
     </p:spTree>
     <p:extLst>
       <p:ext uri="{BB962C8B-B14F-4D97-AF65-F5344CB8AC3E}">
-        <p14:creationId xmlns:p14="http://schemas.microsoft.com/office/powerpoint/2010/main" val="1341573516"/>
+        <p14:creationId xmlns:p14="http://schemas.microsoft.com/office/powerpoint/2010/main" val="2981480262"/>
       </p:ext>
     </p:extLst>
   </p:cSld>
@@ -2328,8 +2070,8 @@
         </p:nvSpPr>
         <p:spPr>
           <a:xfrm>
-            <a:off x="2107782" y="203306"/>
-            <a:ext cx="9869505" cy="711571"/>
+            <a:off x="839898" y="203306"/>
+            <a:ext cx="3932749" cy="711571"/>
           </a:xfrm>
         </p:spPr>
         <p:txBody>
@@ -2360,8 +2102,8 @@
         </p:nvSpPr>
         <p:spPr>
           <a:xfrm>
-            <a:off x="13009262" y="439084"/>
-            <a:ext cx="15491579" cy="2167184"/>
+            <a:off x="5183863" y="439084"/>
+            <a:ext cx="6173004" cy="2167184"/>
           </a:xfrm>
         </p:spPr>
         <p:txBody>
@@ -2445,8 +2187,8 @@
         </p:nvSpPr>
         <p:spPr>
           <a:xfrm>
-            <a:off x="2107782" y="914876"/>
-            <a:ext cx="9869505" cy="1694922"/>
+            <a:off x="839898" y="914876"/>
+            <a:ext cx="3932749" cy="1694922"/>
           </a:xfrm>
         </p:spPr>
         <p:txBody>
@@ -2514,8 +2256,8 @@
           <a:lstStyle/>
           <a:p>
             <a:fld id="{C764DE79-268F-4C1A-8933-263129D2AF90}" type="datetimeFigureOut">
-              <a:rPr lang="en-US" smtClean="0"/>
-              <a:t>12/26/2022</a:t>
+              <a:rPr lang="en-US" dirty="0"/>
+              <a:t>12/27/2022</a:t>
             </a:fld>
             <a:endParaRPr lang="en-US" dirty="0"/>
           </a:p>
@@ -2556,7 +2298,7 @@
           <a:lstStyle/>
           <a:p>
             <a:fld id="{48F63A3B-78C7-47BE-AE5E-E10140E04643}" type="slidenum">
-              <a:rPr lang="en-US" smtClean="0"/>
+              <a:rPr lang="en-US" dirty="0"/>
               <a:t>‹Nr.›</a:t>
             </a:fld>
             <a:endParaRPr lang="en-US" dirty="0"/>
@@ -2566,7 +2308,7 @@
     </p:spTree>
     <p:extLst>
       <p:ext uri="{BB962C8B-B14F-4D97-AF65-F5344CB8AC3E}">
-        <p14:creationId xmlns:p14="http://schemas.microsoft.com/office/powerpoint/2010/main" val="3868348609"/>
+        <p14:creationId xmlns:p14="http://schemas.microsoft.com/office/powerpoint/2010/main" val="956224019"/>
       </p:ext>
     </p:extLst>
   </p:cSld>
@@ -2605,8 +2347,8 @@
         </p:nvSpPr>
         <p:spPr>
           <a:xfrm>
-            <a:off x="2107782" y="203306"/>
-            <a:ext cx="9869505" cy="711571"/>
+            <a:off x="839898" y="203306"/>
+            <a:ext cx="3932749" cy="711571"/>
           </a:xfrm>
         </p:spPr>
         <p:txBody>
@@ -2637,8 +2379,8 @@
         </p:nvSpPr>
         <p:spPr>
           <a:xfrm>
-            <a:off x="13009262" y="439084"/>
-            <a:ext cx="15491579" cy="2167184"/>
+            <a:off x="5183863" y="439084"/>
+            <a:ext cx="6173004" cy="2167184"/>
           </a:xfrm>
         </p:spPr>
         <p:txBody>
@@ -2702,8 +2444,8 @@
         </p:nvSpPr>
         <p:spPr>
           <a:xfrm>
-            <a:off x="2107782" y="914876"/>
-            <a:ext cx="9869505" cy="1694922"/>
+            <a:off x="839898" y="914876"/>
+            <a:ext cx="3932749" cy="1694922"/>
           </a:xfrm>
         </p:spPr>
         <p:txBody>
@@ -2771,8 +2513,8 @@
           <a:lstStyle/>
           <a:p>
             <a:fld id="{C764DE79-268F-4C1A-8933-263129D2AF90}" type="datetimeFigureOut">
-              <a:rPr lang="en-US" smtClean="0"/>
-              <a:t>12/26/2022</a:t>
+              <a:rPr lang="en-US" dirty="0"/>
+              <a:t>12/27/2022</a:t>
             </a:fld>
             <a:endParaRPr lang="en-US" dirty="0"/>
           </a:p>
@@ -2813,7 +2555,7 @@
           <a:lstStyle/>
           <a:p>
             <a:fld id="{48F63A3B-78C7-47BE-AE5E-E10140E04643}" type="slidenum">
-              <a:rPr lang="en-US" smtClean="0"/>
+              <a:rPr lang="en-US" dirty="0"/>
               <a:t>‹Nr.›</a:t>
             </a:fld>
             <a:endParaRPr lang="en-US" dirty="0"/>
@@ -2823,7 +2565,7 @@
     </p:spTree>
     <p:extLst>
       <p:ext uri="{BB962C8B-B14F-4D97-AF65-F5344CB8AC3E}">
-        <p14:creationId xmlns:p14="http://schemas.microsoft.com/office/powerpoint/2010/main" val="2316206662"/>
+        <p14:creationId xmlns:p14="http://schemas.microsoft.com/office/powerpoint/2010/main" val="3152744562"/>
       </p:ext>
     </p:extLst>
   </p:cSld>
@@ -2867,8 +2609,8 @@
         </p:nvSpPr>
         <p:spPr>
           <a:xfrm>
-            <a:off x="2103795" y="162363"/>
-            <a:ext cx="26393061" cy="589446"/>
+            <a:off x="838309" y="162363"/>
+            <a:ext cx="10516970" cy="589446"/>
           </a:xfrm>
           <a:prstGeom prst="rect">
             <a:avLst/>
@@ -2900,8 +2642,8 @@
         </p:nvSpPr>
         <p:spPr>
           <a:xfrm>
-            <a:off x="2103795" y="811811"/>
-            <a:ext cx="26393061" cy="1934936"/>
+            <a:off x="838309" y="811811"/>
+            <a:ext cx="10516970" cy="1934936"/>
           </a:xfrm>
           <a:prstGeom prst="rect">
             <a:avLst/>
@@ -2962,8 +2704,8 @@
         </p:nvSpPr>
         <p:spPr>
           <a:xfrm>
-            <a:off x="2103795" y="2826517"/>
-            <a:ext cx="6885146" cy="162362"/>
+            <a:off x="838309" y="2826517"/>
+            <a:ext cx="2743557" cy="162362"/>
           </a:xfrm>
           <a:prstGeom prst="rect">
             <a:avLst/>
@@ -2984,8 +2726,8 @@
           </a:lstStyle>
           <a:p>
             <a:fld id="{C764DE79-268F-4C1A-8933-263129D2AF90}" type="datetimeFigureOut">
-              <a:rPr lang="en-US" smtClean="0"/>
-              <a:t>12/26/2022</a:t>
+              <a:rPr lang="en-US" dirty="0"/>
+              <a:t>12/27/2022</a:t>
             </a:fld>
             <a:endParaRPr lang="en-US" dirty="0"/>
           </a:p>
@@ -3003,8 +2745,8 @@
         </p:nvSpPr>
         <p:spPr>
           <a:xfrm>
-            <a:off x="10136466" y="2826517"/>
-            <a:ext cx="10327719" cy="162362"/>
+            <a:off x="4039126" y="2826517"/>
+            <a:ext cx="4115336" cy="162362"/>
           </a:xfrm>
           <a:prstGeom prst="rect">
             <a:avLst/>
@@ -3040,8 +2782,8 @@
         </p:nvSpPr>
         <p:spPr>
           <a:xfrm>
-            <a:off x="21611709" y="2826517"/>
-            <a:ext cx="6885146" cy="162362"/>
+            <a:off x="8611722" y="2826517"/>
+            <a:ext cx="2743557" cy="162362"/>
           </a:xfrm>
           <a:prstGeom prst="rect">
             <a:avLst/>
@@ -3062,7 +2804,7 @@
           </a:lstStyle>
           <a:p>
             <a:fld id="{48F63A3B-78C7-47BE-AE5E-E10140E04643}" type="slidenum">
-              <a:rPr lang="en-US" smtClean="0"/>
+              <a:rPr lang="en-US" dirty="0"/>
               <a:t>‹Nr.›</a:t>
             </a:fld>
             <a:endParaRPr lang="en-US" dirty="0"/>
@@ -3072,23 +2814,23 @@
     </p:spTree>
     <p:extLst>
       <p:ext uri="{BB962C8B-B14F-4D97-AF65-F5344CB8AC3E}">
-        <p14:creationId xmlns:p14="http://schemas.microsoft.com/office/powerpoint/2010/main" val="4027221540"/>
+        <p14:creationId xmlns:p14="http://schemas.microsoft.com/office/powerpoint/2010/main" val="1692767427"/>
       </p:ext>
     </p:extLst>
   </p:cSld>
   <p:clrMap bg1="lt1" tx1="dk1" bg2="lt2" tx2="dk2" accent1="accent1" accent2="accent2" accent3="accent3" accent4="accent4" accent5="accent5" accent6="accent6" hlink="hlink" folHlink="folHlink"/>
   <p:sldLayoutIdLst>
-    <p:sldLayoutId id="2147483675" r:id="rId1"/>
-    <p:sldLayoutId id="2147483676" r:id="rId2"/>
-    <p:sldLayoutId id="2147483677" r:id="rId3"/>
-    <p:sldLayoutId id="2147483678" r:id="rId4"/>
-    <p:sldLayoutId id="2147483679" r:id="rId5"/>
-    <p:sldLayoutId id="2147483680" r:id="rId6"/>
-    <p:sldLayoutId id="2147483681" r:id="rId7"/>
-    <p:sldLayoutId id="2147483682" r:id="rId8"/>
-    <p:sldLayoutId id="2147483683" r:id="rId9"/>
-    <p:sldLayoutId id="2147483684" r:id="rId10"/>
-    <p:sldLayoutId id="2147483685" r:id="rId11"/>
+    <p:sldLayoutId id="2147483651" r:id="rId1"/>
+    <p:sldLayoutId id="2147483652" r:id="rId2"/>
+    <p:sldLayoutId id="2147483653" r:id="rId3"/>
+    <p:sldLayoutId id="2147483654" r:id="rId4"/>
+    <p:sldLayoutId id="2147483655" r:id="rId5"/>
+    <p:sldLayoutId id="2147483656" r:id="rId6"/>
+    <p:sldLayoutId id="2147483657" r:id="rId7"/>
+    <p:sldLayoutId id="2147483658" r:id="rId8"/>
+    <p:sldLayoutId id="2147483659" r:id="rId9"/>
+    <p:sldLayoutId id="2147483660" r:id="rId10"/>
+    <p:sldLayoutId id="2147483661" r:id="rId11"/>
   </p:sldLayoutIdLst>
   <p:txStyles>
     <p:titleStyle>
@@ -3421,7 +3163,7 @@
         </p:blipFill>
         <p:spPr>
           <a:xfrm>
-            <a:off x="0" y="0"/>
+            <a:off x="1" y="-11300"/>
             <a:ext cx="3060293" cy="3060293"/>
           </a:xfrm>
           <a:prstGeom prst="rect">
@@ -3443,8 +3185,8 @@
         </p:nvSpPr>
         <p:spPr>
           <a:xfrm>
-            <a:off x="3117444" y="649476"/>
-            <a:ext cx="27483206" cy="2016065"/>
+            <a:off x="3117444" y="179031"/>
+            <a:ext cx="9076143" cy="2015936"/>
           </a:xfrm>
           <a:prstGeom prst="rect">
             <a:avLst/>
@@ -3458,18 +3200,7 @@
           <a:lstStyle/>
           <a:p>
             <a:r>
-              <a:rPr lang="de-DE" sz="12501" b="1" dirty="0">
-                <a:solidFill>
-                  <a:schemeClr val="bg1"/>
-                </a:solidFill>
-                <a:latin typeface="Open Sans" pitchFamily="2" charset="0"/>
-                <a:ea typeface="Open Sans" pitchFamily="2" charset="0"/>
-                <a:cs typeface="Open Sans" pitchFamily="2" charset="0"/>
-              </a:rPr>
-              <a:t>OMSI-Tools</a:t>
-            </a:r>
-            <a:r>
-              <a:rPr lang="de-DE" sz="12501" b="1" dirty="0">
+              <a:rPr lang="de-DE" sz="12500" b="1" dirty="0">
                 <a:solidFill>
                   <a:srgbClr val="34397F"/>
                 </a:solidFill>
@@ -3477,12 +3208,85 @@
                 <a:ea typeface="Open Sans" pitchFamily="2" charset="0"/>
                 <a:cs typeface="Open Sans" pitchFamily="2" charset="0"/>
               </a:rPr>
-              <a:t>			</a:t>
-            </a:r>
-            <a:r>
-              <a:rPr lang="de-DE" sz="12501" b="1" dirty="0">
+              <a:t>OMSI-Tools</a:t>
+            </a:r>
+          </a:p>
+        </p:txBody>
+      </p:sp>
+      <p:sp>
+        <p:nvSpPr>
+          <p:cNvPr id="4" name="Textfeld 3">
+            <a:extLst>
+              <a:ext uri="{FF2B5EF4-FFF2-40B4-BE49-F238E27FC236}">
+                <a16:creationId xmlns:a16="http://schemas.microsoft.com/office/drawing/2014/main" id="{EF40C7D3-5F24-48ED-B417-CA3254D864BB}"/>
+              </a:ext>
+            </a:extLst>
+          </p:cNvPr>
+          <p:cNvSpPr txBox="1"/>
+          <p:nvPr/>
+        </p:nvSpPr>
+        <p:spPr>
+          <a:xfrm>
+            <a:off x="3117446" y="1925049"/>
+            <a:ext cx="2979349" cy="769441"/>
+          </a:xfrm>
+          <a:prstGeom prst="rect">
+            <a:avLst/>
+          </a:prstGeom>
+          <a:noFill/>
+        </p:spPr>
+        <p:txBody>
+          <a:bodyPr wrap="square" rtlCol="0">
+            <a:spAutoFit/>
+          </a:bodyPr>
+          <a:lstStyle/>
+          <a:p>
+            <a:r>
+              <a:rPr lang="de-DE" sz="4400" b="1" dirty="0">
                 <a:solidFill>
-                  <a:srgbClr val="C00000"/>
+                  <a:srgbClr val="008AFF"/>
+                </a:solidFill>
+                <a:latin typeface="Open Sans" pitchFamily="2" charset="0"/>
+                <a:ea typeface="Open Sans" pitchFamily="2" charset="0"/>
+                <a:cs typeface="Open Sans" pitchFamily="2" charset="0"/>
+              </a:rPr>
+              <a:t>		❯❯</a:t>
+            </a:r>
+          </a:p>
+        </p:txBody>
+      </p:sp>
+      <p:sp>
+        <p:nvSpPr>
+          <p:cNvPr id="7" name="Textfeld 6">
+            <a:extLst>
+              <a:ext uri="{FF2B5EF4-FFF2-40B4-BE49-F238E27FC236}">
+                <a16:creationId xmlns:a16="http://schemas.microsoft.com/office/drawing/2014/main" id="{6A8B9C31-6771-4864-919E-7D5534589030}"/>
+              </a:ext>
+            </a:extLst>
+          </p:cNvPr>
+          <p:cNvSpPr txBox="1"/>
+          <p:nvPr/>
+        </p:nvSpPr>
+        <p:spPr>
+          <a:xfrm>
+            <a:off x="4758677" y="1925048"/>
+            <a:ext cx="7434911" cy="769441"/>
+          </a:xfrm>
+          <a:prstGeom prst="rect">
+            <a:avLst/>
+          </a:prstGeom>
+          <a:noFill/>
+        </p:spPr>
+        <p:txBody>
+          <a:bodyPr wrap="square" rtlCol="0">
+            <a:spAutoFit/>
+          </a:bodyPr>
+          <a:lstStyle/>
+          <a:p>
+            <a:r>
+              <a:rPr lang="de-DE" sz="4400" b="1" i="1" dirty="0">
+                <a:solidFill>
+                  <a:srgbClr val="008AFF"/>
                 </a:solidFill>
                 <a:latin typeface="Open Sans" pitchFamily="2" charset="0"/>
                 <a:ea typeface="Open Sans" pitchFamily="2" charset="0"/>

</xml_diff>